<commit_message>
removed papers that do not fit our criteria
</commit_message>
<xml_diff>
--- a/PRISMA/PRISMA.pptx
+++ b/PRISMA/PRISMA.pptx
@@ -254,7 +254,7 @@
           <a:p>
             <a:fld id="{B741A2BA-98EC-B742-8E2C-55D74891877C}" type="datetimeFigureOut">
               <a:rPr lang="en-US" smtClean="0"/>
-              <a:t>12/18/20</a:t>
+              <a:t>1/11/21</a:t>
             </a:fld>
             <a:endParaRPr lang="en-US"/>
           </a:p>
@@ -424,7 +424,7 @@
           <a:p>
             <a:fld id="{B741A2BA-98EC-B742-8E2C-55D74891877C}" type="datetimeFigureOut">
               <a:rPr lang="en-US" smtClean="0"/>
-              <a:t>12/18/20</a:t>
+              <a:t>1/11/21</a:t>
             </a:fld>
             <a:endParaRPr lang="en-US"/>
           </a:p>
@@ -604,7 +604,7 @@
           <a:p>
             <a:fld id="{B741A2BA-98EC-B742-8E2C-55D74891877C}" type="datetimeFigureOut">
               <a:rPr lang="en-US" smtClean="0"/>
-              <a:t>12/18/20</a:t>
+              <a:t>1/11/21</a:t>
             </a:fld>
             <a:endParaRPr lang="en-US"/>
           </a:p>
@@ -774,7 +774,7 @@
           <a:p>
             <a:fld id="{B741A2BA-98EC-B742-8E2C-55D74891877C}" type="datetimeFigureOut">
               <a:rPr lang="en-US" smtClean="0"/>
-              <a:t>12/18/20</a:t>
+              <a:t>1/11/21</a:t>
             </a:fld>
             <a:endParaRPr lang="en-US"/>
           </a:p>
@@ -1018,7 +1018,7 @@
           <a:p>
             <a:fld id="{B741A2BA-98EC-B742-8E2C-55D74891877C}" type="datetimeFigureOut">
               <a:rPr lang="en-US" smtClean="0"/>
-              <a:t>12/18/20</a:t>
+              <a:t>1/11/21</a:t>
             </a:fld>
             <a:endParaRPr lang="en-US"/>
           </a:p>
@@ -1250,7 +1250,7 @@
           <a:p>
             <a:fld id="{B741A2BA-98EC-B742-8E2C-55D74891877C}" type="datetimeFigureOut">
               <a:rPr lang="en-US" smtClean="0"/>
-              <a:t>12/18/20</a:t>
+              <a:t>1/11/21</a:t>
             </a:fld>
             <a:endParaRPr lang="en-US"/>
           </a:p>
@@ -1617,7 +1617,7 @@
           <a:p>
             <a:fld id="{B741A2BA-98EC-B742-8E2C-55D74891877C}" type="datetimeFigureOut">
               <a:rPr lang="en-US" smtClean="0"/>
-              <a:t>12/18/20</a:t>
+              <a:t>1/11/21</a:t>
             </a:fld>
             <a:endParaRPr lang="en-US"/>
           </a:p>
@@ -1735,7 +1735,7 @@
           <a:p>
             <a:fld id="{B741A2BA-98EC-B742-8E2C-55D74891877C}" type="datetimeFigureOut">
               <a:rPr lang="en-US" smtClean="0"/>
-              <a:t>12/18/20</a:t>
+              <a:t>1/11/21</a:t>
             </a:fld>
             <a:endParaRPr lang="en-US"/>
           </a:p>
@@ -1830,7 +1830,7 @@
           <a:p>
             <a:fld id="{B741A2BA-98EC-B742-8E2C-55D74891877C}" type="datetimeFigureOut">
               <a:rPr lang="en-US" smtClean="0"/>
-              <a:t>12/18/20</a:t>
+              <a:t>1/11/21</a:t>
             </a:fld>
             <a:endParaRPr lang="en-US"/>
           </a:p>
@@ -2107,7 +2107,7 @@
           <a:p>
             <a:fld id="{B741A2BA-98EC-B742-8E2C-55D74891877C}" type="datetimeFigureOut">
               <a:rPr lang="en-US" smtClean="0"/>
-              <a:t>12/18/20</a:t>
+              <a:t>1/11/21</a:t>
             </a:fld>
             <a:endParaRPr lang="en-US"/>
           </a:p>
@@ -2364,7 +2364,7 @@
           <a:p>
             <a:fld id="{B741A2BA-98EC-B742-8E2C-55D74891877C}" type="datetimeFigureOut">
               <a:rPr lang="en-US" smtClean="0"/>
-              <a:t>12/18/20</a:t>
+              <a:t>1/11/21</a:t>
             </a:fld>
             <a:endParaRPr lang="en-US"/>
           </a:p>
@@ -2577,7 +2577,7 @@
           <a:p>
             <a:fld id="{B741A2BA-98EC-B742-8E2C-55D74891877C}" type="datetimeFigureOut">
               <a:rPr lang="en-US" smtClean="0"/>
-              <a:t>12/18/20</a:t>
+              <a:t>1/11/21</a:t>
             </a:fld>
             <a:endParaRPr lang="en-US"/>
           </a:p>
@@ -3657,7 +3657,7 @@
               <a:pPr algn="ctr"/>
               <a:r>
                 <a:rPr lang="en-US" sz="1050" dirty="0"/>
-                <a:t>(N = 177)</a:t>
+                <a:t>(N = 179)</a:t>
               </a:r>
             </a:p>
           </p:txBody>
@@ -3889,8 +3889,13 @@
               <a:pPr algn="ctr"/>
               <a:r>
                 <a:rPr lang="en-US" sz="1050" dirty="0"/>
-                <a:t>(N = 37)</a:t>
+                <a:t>(N </a:t>
               </a:r>
+              <a:r>
+                <a:rPr lang="en-US" sz="1050"/>
+                <a:t>= 35)</a:t>
+              </a:r>
+              <a:endParaRPr lang="en-US" sz="1050" dirty="0"/>
             </a:p>
           </p:txBody>
         </p:sp>

</xml_diff>